<commit_message>
Update Clean Code - Chapter 4.pptx
chapter 4 - pages from 58 to 62
</commit_message>
<xml_diff>
--- a/Clean Code - Chapter 4.pptx
+++ b/Clean Code - Chapter 4.pptx
@@ -15,6 +15,14 @@
     <p:sldId id="263" r:id="rId9"/>
     <p:sldId id="264" r:id="rId10"/>
     <p:sldId id="265" r:id="rId11"/>
+    <p:sldId id="266" r:id="rId12"/>
+    <p:sldId id="267" r:id="rId13"/>
+    <p:sldId id="268" r:id="rId14"/>
+    <p:sldId id="269" r:id="rId15"/>
+    <p:sldId id="270" r:id="rId16"/>
+    <p:sldId id="271" r:id="rId17"/>
+    <p:sldId id="272" r:id="rId18"/>
+    <p:sldId id="273" r:id="rId19"/>
   </p:sldIdLst>
   <p:sldSz cx="12192000" cy="6858000"/>
   <p:notesSz cx="6858000" cy="9144000"/>
@@ -268,7 +276,7 @@
           <a:p>
             <a:fld id="{82EDB8D0-98ED-4B86-9D5F-E61ADC70144D}" type="datetimeFigureOut">
               <a:rPr lang="en-US" smtClean="0"/>
-              <a:t>05-Jul-25</a:t>
+              <a:t>06-Jul-25</a:t>
             </a:fld>
             <a:endParaRPr lang="en-US" dirty="0"/>
           </a:p>
@@ -683,7 +691,7 @@
           <a:p>
             <a:fld id="{82EDB8D0-98ED-4B86-9D5F-E61ADC70144D}" type="datetimeFigureOut">
               <a:rPr lang="en-US" smtClean="0"/>
-              <a:t>05-Jul-25</a:t>
+              <a:t>06-Jul-25</a:t>
             </a:fld>
             <a:endParaRPr lang="en-US"/>
           </a:p>
@@ -1175,7 +1183,7 @@
           <a:p>
             <a:fld id="{82EDB8D0-98ED-4B86-9D5F-E61ADC70144D}" type="datetimeFigureOut">
               <a:rPr lang="en-US" smtClean="0"/>
-              <a:t>05-Jul-25</a:t>
+              <a:t>06-Jul-25</a:t>
             </a:fld>
             <a:endParaRPr lang="en-US"/>
           </a:p>
@@ -1662,7 +1670,7 @@
           <a:p>
             <a:fld id="{82EDB8D0-98ED-4B86-9D5F-E61ADC70144D}" type="datetimeFigureOut">
               <a:rPr lang="en-US" smtClean="0"/>
-              <a:t>05-Jul-25</a:t>
+              <a:t>06-Jul-25</a:t>
             </a:fld>
             <a:endParaRPr lang="en-US" dirty="0"/>
           </a:p>
@@ -2431,7 +2439,7 @@
           <a:p>
             <a:fld id="{82EDB8D0-98ED-4B86-9D5F-E61ADC70144D}" type="datetimeFigureOut">
               <a:rPr lang="en-US" smtClean="0"/>
-              <a:t>05-Jul-25</a:t>
+              <a:t>06-Jul-25</a:t>
             </a:fld>
             <a:endParaRPr lang="en-US"/>
           </a:p>
@@ -2913,7 +2921,7 @@
           <a:p>
             <a:fld id="{82EDB8D0-98ED-4B86-9D5F-E61ADC70144D}" type="datetimeFigureOut">
               <a:rPr lang="en-US" smtClean="0"/>
-              <a:t>05-Jul-25</a:t>
+              <a:t>06-Jul-25</a:t>
             </a:fld>
             <a:endParaRPr lang="en-US"/>
           </a:p>
@@ -3609,7 +3617,7 @@
           <a:p>
             <a:fld id="{82EDB8D0-98ED-4B86-9D5F-E61ADC70144D}" type="datetimeFigureOut">
               <a:rPr lang="en-US" smtClean="0"/>
-              <a:t>05-Jul-25</a:t>
+              <a:t>06-Jul-25</a:t>
             </a:fld>
             <a:endParaRPr lang="en-US"/>
           </a:p>
@@ -4034,7 +4042,7 @@
           <a:p>
             <a:fld id="{82EDB8D0-98ED-4B86-9D5F-E61ADC70144D}" type="datetimeFigureOut">
               <a:rPr lang="en-US" smtClean="0"/>
-              <a:t>05-Jul-25</a:t>
+              <a:t>06-Jul-25</a:t>
             </a:fld>
             <a:endParaRPr lang="en-US"/>
           </a:p>
@@ -4431,7 +4439,7 @@
           <a:p>
             <a:fld id="{82EDB8D0-98ED-4B86-9D5F-E61ADC70144D}" type="datetimeFigureOut">
               <a:rPr lang="en-US" smtClean="0"/>
-              <a:t>05-Jul-25</a:t>
+              <a:t>06-Jul-25</a:t>
             </a:fld>
             <a:endParaRPr lang="en-US"/>
           </a:p>
@@ -5026,7 +5034,7 @@
           <a:p>
             <a:fld id="{82EDB8D0-98ED-4B86-9D5F-E61ADC70144D}" type="datetimeFigureOut">
               <a:rPr lang="en-US" smtClean="0"/>
-              <a:t>05-Jul-25</a:t>
+              <a:t>06-Jul-25</a:t>
             </a:fld>
             <a:endParaRPr lang="en-US"/>
           </a:p>
@@ -5601,7 +5609,7 @@
           <a:p>
             <a:fld id="{82EDB8D0-98ED-4B86-9D5F-E61ADC70144D}" type="datetimeFigureOut">
               <a:rPr lang="en-US" smtClean="0"/>
-              <a:t>05-Jul-25</a:t>
+              <a:t>06-Jul-25</a:t>
             </a:fld>
             <a:endParaRPr lang="en-US"/>
           </a:p>
@@ -6128,7 +6136,7 @@
             <a:fld id="{82EDB8D0-98ED-4B86-9D5F-E61ADC70144D}" type="datetimeFigureOut">
               <a:rPr lang="en-US" smtClean="0"/>
               <a:pPr/>
-              <a:t>05-Jul-25</a:t>
+              <a:t>06-Jul-25</a:t>
             </a:fld>
             <a:endParaRPr lang="en-US" dirty="0"/>
           </a:p>
@@ -7715,6 +7723,1214 @@
 </p:sld>
 </file>
 
+<file path=ppt/slides/slide11.xml><?xml version="1.0" encoding="utf-8"?>
+<p:sld xmlns:a="http://schemas.openxmlformats.org/drawingml/2006/main" xmlns:r="http://schemas.openxmlformats.org/officeDocument/2006/relationships" xmlns:p="http://schemas.openxmlformats.org/presentationml/2006/main">
+  <p:cSld>
+    <p:spTree>
+      <p:nvGrpSpPr>
+        <p:cNvPr id="1" name=""/>
+        <p:cNvGrpSpPr/>
+        <p:nvPr/>
+      </p:nvGrpSpPr>
+      <p:grpSpPr>
+        <a:xfrm>
+          <a:off x="0" y="0"/>
+          <a:ext cx="0" cy="0"/>
+          <a:chOff x="0" y="0"/>
+          <a:chExt cx="0" cy="0"/>
+        </a:xfrm>
+      </p:grpSpPr>
+      <p:sp>
+        <p:nvSpPr>
+          <p:cNvPr id="2" name="Title 1">
+            <a:extLst>
+              <a:ext uri="{FF2B5EF4-FFF2-40B4-BE49-F238E27FC236}">
+                <a16:creationId xmlns:a16="http://schemas.microsoft.com/office/drawing/2014/main" id="{464A8941-BC1E-114C-035D-F2E37EAEC099}"/>
+              </a:ext>
+            </a:extLst>
+          </p:cNvPr>
+          <p:cNvSpPr>
+            <a:spLocks noGrp="1"/>
+          </p:cNvSpPr>
+          <p:nvPr>
+            <p:ph type="title"/>
+          </p:nvPr>
+        </p:nvSpPr>
+        <p:spPr/>
+        <p:txBody>
+          <a:bodyPr/>
+          <a:lstStyle/>
+          <a:p>
+            <a:r>
+              <a:rPr lang="en-US" dirty="0"/>
+              <a:t>Good Comments – Warning of Consequences</a:t>
+            </a:r>
+          </a:p>
+        </p:txBody>
+      </p:sp>
+      <p:sp>
+        <p:nvSpPr>
+          <p:cNvPr id="3" name="Content Placeholder 2">
+            <a:extLst>
+              <a:ext uri="{FF2B5EF4-FFF2-40B4-BE49-F238E27FC236}">
+                <a16:creationId xmlns:a16="http://schemas.microsoft.com/office/drawing/2014/main" id="{C1375AD4-753C-7DAF-266A-0355986F1AE9}"/>
+              </a:ext>
+            </a:extLst>
+          </p:cNvPr>
+          <p:cNvSpPr>
+            <a:spLocks noGrp="1"/>
+          </p:cNvSpPr>
+          <p:nvPr>
+            <p:ph idx="1"/>
+          </p:nvPr>
+        </p:nvSpPr>
+        <p:spPr/>
+        <p:txBody>
+          <a:bodyPr/>
+          <a:lstStyle/>
+          <a:p>
+            <a:r>
+              <a:rPr lang="en-US" dirty="0"/>
+              <a:t>Sometimes it’s useful to warn other programmers about certain consequences.</a:t>
+            </a:r>
+          </a:p>
+          <a:p>
+            <a:endParaRPr lang="en-US" dirty="0"/>
+          </a:p>
+          <a:p>
+            <a:r>
+              <a:rPr lang="en-US" dirty="0"/>
+              <a:t>In the past, putting an underscore in front of the method name was a common convention.</a:t>
+            </a:r>
+          </a:p>
+          <a:p>
+            <a:endParaRPr lang="en-US" dirty="0"/>
+          </a:p>
+          <a:p>
+            <a:r>
+              <a:rPr lang="en-US" dirty="0"/>
+              <a:t>Nowadays, we’d turn off the test case by using </a:t>
+            </a:r>
+            <a:r>
+              <a:rPr lang="en-US" sz="2400" dirty="0"/>
+              <a:t>@Ignore</a:t>
+            </a:r>
+            <a:r>
+              <a:rPr lang="en-US" dirty="0"/>
+              <a:t> attribute with an appropriate explanatory string.</a:t>
+            </a:r>
+          </a:p>
+          <a:p>
+            <a:pPr marL="0" indent="0">
+              <a:buNone/>
+            </a:pPr>
+            <a:endParaRPr lang="en-US" dirty="0"/>
+          </a:p>
+        </p:txBody>
+      </p:sp>
+    </p:spTree>
+    <p:extLst>
+      <p:ext uri="{BB962C8B-B14F-4D97-AF65-F5344CB8AC3E}">
+        <p14:creationId xmlns:p14="http://schemas.microsoft.com/office/powerpoint/2010/main" val="4003150861"/>
+      </p:ext>
+    </p:extLst>
+  </p:cSld>
+  <p:clrMapOvr>
+    <a:masterClrMapping/>
+  </p:clrMapOvr>
+</p:sld>
+</file>
+
+<file path=ppt/slides/slide12.xml><?xml version="1.0" encoding="utf-8"?>
+<p:sld xmlns:a="http://schemas.openxmlformats.org/drawingml/2006/main" xmlns:r="http://schemas.openxmlformats.org/officeDocument/2006/relationships" xmlns:p="http://schemas.openxmlformats.org/presentationml/2006/main">
+  <p:cSld>
+    <p:spTree>
+      <p:nvGrpSpPr>
+        <p:cNvPr id="1" name=""/>
+        <p:cNvGrpSpPr/>
+        <p:nvPr/>
+      </p:nvGrpSpPr>
+      <p:grpSpPr>
+        <a:xfrm>
+          <a:off x="0" y="0"/>
+          <a:ext cx="0" cy="0"/>
+          <a:chOff x="0" y="0"/>
+          <a:chExt cx="0" cy="0"/>
+        </a:xfrm>
+      </p:grpSpPr>
+      <p:sp>
+        <p:nvSpPr>
+          <p:cNvPr id="2" name="Title 1">
+            <a:extLst>
+              <a:ext uri="{FF2B5EF4-FFF2-40B4-BE49-F238E27FC236}">
+                <a16:creationId xmlns:a16="http://schemas.microsoft.com/office/drawing/2014/main" id="{65660C75-0475-E62D-C5A1-A079620D462E}"/>
+              </a:ext>
+            </a:extLst>
+          </p:cNvPr>
+          <p:cNvSpPr>
+            <a:spLocks noGrp="1"/>
+          </p:cNvSpPr>
+          <p:nvPr>
+            <p:ph type="title"/>
+          </p:nvPr>
+        </p:nvSpPr>
+        <p:spPr/>
+        <p:txBody>
+          <a:bodyPr/>
+          <a:lstStyle/>
+          <a:p>
+            <a:r>
+              <a:rPr lang="en-US" dirty="0"/>
+              <a:t>Good Comments – TODO Comments</a:t>
+            </a:r>
+          </a:p>
+        </p:txBody>
+      </p:sp>
+      <p:sp>
+        <p:nvSpPr>
+          <p:cNvPr id="3" name="Content Placeholder 2">
+            <a:extLst>
+              <a:ext uri="{FF2B5EF4-FFF2-40B4-BE49-F238E27FC236}">
+                <a16:creationId xmlns:a16="http://schemas.microsoft.com/office/drawing/2014/main" id="{192CEEC4-97F9-665D-8BE1-6092DFF0C3CA}"/>
+              </a:ext>
+            </a:extLst>
+          </p:cNvPr>
+          <p:cNvSpPr>
+            <a:spLocks noGrp="1"/>
+          </p:cNvSpPr>
+          <p:nvPr>
+            <p:ph idx="1"/>
+          </p:nvPr>
+        </p:nvSpPr>
+        <p:spPr/>
+        <p:txBody>
+          <a:bodyPr/>
+          <a:lstStyle/>
+          <a:p>
+            <a:r>
+              <a:rPr lang="en-US" sz="2400" dirty="0"/>
+              <a:t>TODO</a:t>
+            </a:r>
+            <a:r>
+              <a:rPr lang="en-US" dirty="0"/>
+              <a:t>s are jobs that the programmer thinks should be done, but for some reason can’t do at the moment.</a:t>
+            </a:r>
+          </a:p>
+          <a:p>
+            <a:r>
+              <a:rPr lang="en-US" dirty="0"/>
+              <a:t>It might be:</a:t>
+            </a:r>
+          </a:p>
+          <a:p>
+            <a:pPr lvl="1"/>
+            <a:r>
+              <a:rPr lang="en-US" dirty="0"/>
+              <a:t>remainder to delete a deprecated feature or a plea for someone else to look at a problem.</a:t>
+            </a:r>
+          </a:p>
+          <a:p>
+            <a:pPr lvl="1"/>
+            <a:r>
+              <a:rPr lang="en-US" dirty="0"/>
+              <a:t>a request for someone else to think of a better name.</a:t>
+            </a:r>
+          </a:p>
+          <a:p>
+            <a:pPr lvl="1"/>
+            <a:r>
+              <a:rPr lang="en-US" dirty="0"/>
+              <a:t>a remainder to make a change that is dependent on a planned event.</a:t>
+            </a:r>
+          </a:p>
+          <a:p>
+            <a:r>
+              <a:rPr lang="en-US" dirty="0"/>
+              <a:t>It’s not a an excuse to leave bad code in the system.</a:t>
+            </a:r>
+          </a:p>
+        </p:txBody>
+      </p:sp>
+    </p:spTree>
+    <p:extLst>
+      <p:ext uri="{BB962C8B-B14F-4D97-AF65-F5344CB8AC3E}">
+        <p14:creationId xmlns:p14="http://schemas.microsoft.com/office/powerpoint/2010/main" val="2920602751"/>
+      </p:ext>
+    </p:extLst>
+  </p:cSld>
+  <p:clrMapOvr>
+    <a:masterClrMapping/>
+  </p:clrMapOvr>
+</p:sld>
+</file>
+
+<file path=ppt/slides/slide13.xml><?xml version="1.0" encoding="utf-8"?>
+<p:sld xmlns:a="http://schemas.openxmlformats.org/drawingml/2006/main" xmlns:r="http://schemas.openxmlformats.org/officeDocument/2006/relationships" xmlns:p="http://schemas.openxmlformats.org/presentationml/2006/main">
+  <p:cSld>
+    <p:bg>
+      <p:bgPr>
+        <a:solidFill>
+          <a:schemeClr val="bg1"/>
+        </a:solidFill>
+        <a:effectLst/>
+      </p:bgPr>
+    </p:bg>
+    <p:spTree>
+      <p:nvGrpSpPr>
+        <p:cNvPr id="1" name=""/>
+        <p:cNvGrpSpPr/>
+        <p:nvPr/>
+      </p:nvGrpSpPr>
+      <p:grpSpPr>
+        <a:xfrm>
+          <a:off x="0" y="0"/>
+          <a:ext cx="0" cy="0"/>
+          <a:chOff x="0" y="0"/>
+          <a:chExt cx="0" cy="0"/>
+        </a:xfrm>
+      </p:grpSpPr>
+      <p:sp useBgFill="1">
+        <p:nvSpPr>
+          <p:cNvPr id="10" name="Rectangle 9">
+            <a:extLst>
+              <a:ext uri="{FF2B5EF4-FFF2-40B4-BE49-F238E27FC236}">
+                <a16:creationId xmlns:a16="http://schemas.microsoft.com/office/drawing/2014/main" id="{66E48AFA-8884-4F68-A44F-D2C1E8609C5A}"/>
+              </a:ext>
+              <a:ext uri="{C183D7F6-B498-43B3-948B-1728B52AA6E4}">
+                <adec:decorative xmlns:adec="http://schemas.microsoft.com/office/drawing/2017/decorative" val="1"/>
+              </a:ext>
+            </a:extLst>
+          </p:cNvPr>
+          <p:cNvSpPr>
+            <a:spLocks noGrp="1" noRot="1" noChangeAspect="1" noMove="1" noResize="1" noEditPoints="1" noAdjustHandles="1" noChangeArrowheads="1" noChangeShapeType="1" noTextEdit="1"/>
+          </p:cNvSpPr>
+          <p:nvPr>
+            <p:extLst>
+              <p:ext uri="{386F3935-93C4-4BCD-93E2-E3B085C9AB24}">
+                <p16:designElem xmlns:p16="http://schemas.microsoft.com/office/powerpoint/2015/main" val="1"/>
+              </p:ext>
+            </p:extLst>
+          </p:nvPr>
+        </p:nvSpPr>
+        <p:spPr bwMode="white">
+          <a:xfrm>
+            <a:off x="0" y="0"/>
+            <a:ext cx="12192000" cy="6858000"/>
+          </a:xfrm>
+          <a:prstGeom prst="rect">
+            <a:avLst/>
+          </a:prstGeom>
+          <a:ln>
+            <a:noFill/>
+          </a:ln>
+        </p:spPr>
+        <p:style>
+          <a:lnRef idx="2">
+            <a:schemeClr val="accent1">
+              <a:shade val="50000"/>
+            </a:schemeClr>
+          </a:lnRef>
+          <a:fillRef idx="1">
+            <a:schemeClr val="accent1"/>
+          </a:fillRef>
+          <a:effectRef idx="0">
+            <a:schemeClr val="accent1"/>
+          </a:effectRef>
+          <a:fontRef idx="minor">
+            <a:schemeClr val="lt1"/>
+          </a:fontRef>
+        </p:style>
+        <p:txBody>
+          <a:bodyPr rtlCol="0" anchor="ctr"/>
+          <a:lstStyle>
+            <a:defPPr>
+              <a:defRPr lang="en-US"/>
+            </a:defPPr>
+            <a:lvl1pPr marL="0" algn="l" defTabSz="914400" rtl="0" eaLnBrk="1" latinLnBrk="0" hangingPunct="1">
+              <a:defRPr sz="1800" kern="1200">
+                <a:solidFill>
+                  <a:schemeClr val="lt1"/>
+                </a:solidFill>
+                <a:latin typeface="+mn-lt"/>
+                <a:ea typeface="+mn-ea"/>
+                <a:cs typeface="+mn-cs"/>
+              </a:defRPr>
+            </a:lvl1pPr>
+            <a:lvl2pPr marL="457200" algn="l" defTabSz="914400" rtl="0" eaLnBrk="1" latinLnBrk="0" hangingPunct="1">
+              <a:defRPr sz="1800" kern="1200">
+                <a:solidFill>
+                  <a:schemeClr val="lt1"/>
+                </a:solidFill>
+                <a:latin typeface="+mn-lt"/>
+                <a:ea typeface="+mn-ea"/>
+                <a:cs typeface="+mn-cs"/>
+              </a:defRPr>
+            </a:lvl2pPr>
+            <a:lvl3pPr marL="914400" algn="l" defTabSz="914400" rtl="0" eaLnBrk="1" latinLnBrk="0" hangingPunct="1">
+              <a:defRPr sz="1800" kern="1200">
+                <a:solidFill>
+                  <a:schemeClr val="lt1"/>
+                </a:solidFill>
+                <a:latin typeface="+mn-lt"/>
+                <a:ea typeface="+mn-ea"/>
+                <a:cs typeface="+mn-cs"/>
+              </a:defRPr>
+            </a:lvl3pPr>
+            <a:lvl4pPr marL="1371600" algn="l" defTabSz="914400" rtl="0" eaLnBrk="1" latinLnBrk="0" hangingPunct="1">
+              <a:defRPr sz="1800" kern="1200">
+                <a:solidFill>
+                  <a:schemeClr val="lt1"/>
+                </a:solidFill>
+                <a:latin typeface="+mn-lt"/>
+                <a:ea typeface="+mn-ea"/>
+                <a:cs typeface="+mn-cs"/>
+              </a:defRPr>
+            </a:lvl4pPr>
+            <a:lvl5pPr marL="1828800" algn="l" defTabSz="914400" rtl="0" eaLnBrk="1" latinLnBrk="0" hangingPunct="1">
+              <a:defRPr sz="1800" kern="1200">
+                <a:solidFill>
+                  <a:schemeClr val="lt1"/>
+                </a:solidFill>
+                <a:latin typeface="+mn-lt"/>
+                <a:ea typeface="+mn-ea"/>
+                <a:cs typeface="+mn-cs"/>
+              </a:defRPr>
+            </a:lvl5pPr>
+            <a:lvl6pPr marL="2286000" algn="l" defTabSz="914400" rtl="0" eaLnBrk="1" latinLnBrk="0" hangingPunct="1">
+              <a:defRPr sz="1800" kern="1200">
+                <a:solidFill>
+                  <a:schemeClr val="lt1"/>
+                </a:solidFill>
+                <a:latin typeface="+mn-lt"/>
+                <a:ea typeface="+mn-ea"/>
+                <a:cs typeface="+mn-cs"/>
+              </a:defRPr>
+            </a:lvl6pPr>
+            <a:lvl7pPr marL="2743200" algn="l" defTabSz="914400" rtl="0" eaLnBrk="1" latinLnBrk="0" hangingPunct="1">
+              <a:defRPr sz="1800" kern="1200">
+                <a:solidFill>
+                  <a:schemeClr val="lt1"/>
+                </a:solidFill>
+                <a:latin typeface="+mn-lt"/>
+                <a:ea typeface="+mn-ea"/>
+                <a:cs typeface="+mn-cs"/>
+              </a:defRPr>
+            </a:lvl7pPr>
+            <a:lvl8pPr marL="3200400" algn="l" defTabSz="914400" rtl="0" eaLnBrk="1" latinLnBrk="0" hangingPunct="1">
+              <a:defRPr sz="1800" kern="1200">
+                <a:solidFill>
+                  <a:schemeClr val="lt1"/>
+                </a:solidFill>
+                <a:latin typeface="+mn-lt"/>
+                <a:ea typeface="+mn-ea"/>
+                <a:cs typeface="+mn-cs"/>
+              </a:defRPr>
+            </a:lvl8pPr>
+            <a:lvl9pPr marL="3657600" algn="l" defTabSz="914400" rtl="0" eaLnBrk="1" latinLnBrk="0" hangingPunct="1">
+              <a:defRPr sz="1800" kern="1200">
+                <a:solidFill>
+                  <a:schemeClr val="lt1"/>
+                </a:solidFill>
+                <a:latin typeface="+mn-lt"/>
+                <a:ea typeface="+mn-ea"/>
+                <a:cs typeface="+mn-cs"/>
+              </a:defRPr>
+            </a:lvl9pPr>
+          </a:lstStyle>
+          <a:p>
+            <a:pPr marL="0" marR="0" lvl="0" indent="0" algn="ctr" defTabSz="914400" rtl="0" eaLnBrk="1" fontAlgn="auto" latinLnBrk="0" hangingPunct="1">
+              <a:lnSpc>
+                <a:spcPct val="100000"/>
+              </a:lnSpc>
+              <a:spcBef>
+                <a:spcPts val="0"/>
+              </a:spcBef>
+              <a:spcAft>
+                <a:spcPts val="0"/>
+              </a:spcAft>
+              <a:buClrTx/>
+              <a:buSzTx/>
+              <a:buFontTx/>
+              <a:buNone/>
+              <a:tabLst/>
+              <a:defRPr/>
+            </a:pPr>
+            <a:endParaRPr kumimoji="0" lang="en-US" sz="1800" b="0" i="0" u="none" strike="noStrike" kern="1200" cap="none" spc="0" normalizeH="0" baseline="0" noProof="0">
+              <a:ln>
+                <a:noFill/>
+              </a:ln>
+              <a:solidFill>
+                <a:prstClr val="white"/>
+              </a:solidFill>
+              <a:effectLst/>
+              <a:uLnTx/>
+              <a:uFillTx/>
+              <a:latin typeface="Calibri" panose="020F0502020204030204"/>
+              <a:ea typeface="+mn-ea"/>
+              <a:cs typeface="+mn-cs"/>
+            </a:endParaRPr>
+          </a:p>
+        </p:txBody>
+      </p:sp>
+      <p:sp>
+        <p:nvSpPr>
+          <p:cNvPr id="2" name="Title 1">
+            <a:extLst>
+              <a:ext uri="{FF2B5EF4-FFF2-40B4-BE49-F238E27FC236}">
+                <a16:creationId xmlns:a16="http://schemas.microsoft.com/office/drawing/2014/main" id="{D7DF40DF-C9A8-FCEE-FEE8-8AFB5C4838BD}"/>
+              </a:ext>
+            </a:extLst>
+          </p:cNvPr>
+          <p:cNvSpPr>
+            <a:spLocks noGrp="1"/>
+          </p:cNvSpPr>
+          <p:nvPr>
+            <p:ph type="title"/>
+          </p:nvPr>
+        </p:nvSpPr>
+        <p:spPr>
+          <a:xfrm>
+            <a:off x="838201" y="3998018"/>
+            <a:ext cx="3981854" cy="2216513"/>
+          </a:xfrm>
+        </p:spPr>
+        <p:txBody>
+          <a:bodyPr>
+            <a:normAutofit/>
+          </a:bodyPr>
+          <a:lstStyle/>
+          <a:p>
+            <a:r>
+              <a:rPr lang="en-US" dirty="0"/>
+              <a:t>Good Comments – Amplification</a:t>
+            </a:r>
+          </a:p>
+        </p:txBody>
+      </p:sp>
+      <p:sp>
+        <p:nvSpPr>
+          <p:cNvPr id="12" name="Arc 11">
+            <a:extLst>
+              <a:ext uri="{FF2B5EF4-FFF2-40B4-BE49-F238E27FC236}">
+                <a16:creationId xmlns:a16="http://schemas.microsoft.com/office/drawing/2014/main" id="{969D19A6-08CB-498C-93EC-3FFB021FC68A}"/>
+              </a:ext>
+              <a:ext uri="{C183D7F6-B498-43B3-948B-1728B52AA6E4}">
+                <adec:decorative xmlns:adec="http://schemas.microsoft.com/office/drawing/2017/decorative" val="1"/>
+              </a:ext>
+            </a:extLst>
+          </p:cNvPr>
+          <p:cNvSpPr>
+            <a:spLocks noGrp="1" noRot="1" noChangeAspect="1" noMove="1" noResize="1" noEditPoints="1" noAdjustHandles="1" noChangeArrowheads="1" noChangeShapeType="1" noTextEdit="1"/>
+          </p:cNvSpPr>
+          <p:nvPr>
+            <p:extLst>
+              <p:ext uri="{386F3935-93C4-4BCD-93E2-E3B085C9AB24}">
+                <p16:designElem xmlns:p16="http://schemas.microsoft.com/office/powerpoint/2015/main" val="1"/>
+              </p:ext>
+            </p:extLst>
+          </p:nvPr>
+        </p:nvSpPr>
+        <p:spPr>
+          <a:xfrm rot="6269068">
+            <a:off x="8717845" y="3339275"/>
+            <a:ext cx="2987899" cy="2987899"/>
+          </a:xfrm>
+          <a:prstGeom prst="arc">
+            <a:avLst>
+              <a:gd name="adj1" fmla="val 14441841"/>
+              <a:gd name="adj2" fmla="val 0"/>
+            </a:avLst>
+          </a:prstGeom>
+          <a:ln w="127000" cap="rnd">
+            <a:solidFill>
+              <a:schemeClr val="accent4"/>
+            </a:solidFill>
+            <a:prstDash val="dash"/>
+            <a:miter lim="800000"/>
+          </a:ln>
+        </p:spPr>
+        <p:style>
+          <a:lnRef idx="1">
+            <a:schemeClr val="accent1"/>
+          </a:lnRef>
+          <a:fillRef idx="0">
+            <a:schemeClr val="accent1"/>
+          </a:fillRef>
+          <a:effectRef idx="0">
+            <a:schemeClr val="accent1"/>
+          </a:effectRef>
+          <a:fontRef idx="minor">
+            <a:schemeClr val="tx1"/>
+          </a:fontRef>
+        </p:style>
+        <p:txBody>
+          <a:bodyPr rtlCol="0" anchor="ctr"/>
+          <a:lstStyle/>
+          <a:p>
+            <a:pPr marL="0" marR="0" lvl="0" indent="0" algn="ctr" defTabSz="914400" rtl="0" eaLnBrk="1" fontAlgn="auto" latinLnBrk="0" hangingPunct="1">
+              <a:lnSpc>
+                <a:spcPct val="100000"/>
+              </a:lnSpc>
+              <a:spcBef>
+                <a:spcPts val="0"/>
+              </a:spcBef>
+              <a:spcAft>
+                <a:spcPts val="0"/>
+              </a:spcAft>
+              <a:buClrTx/>
+              <a:buSzTx/>
+              <a:buFontTx/>
+              <a:buNone/>
+              <a:tabLst/>
+              <a:defRPr/>
+            </a:pPr>
+            <a:endParaRPr kumimoji="0" lang="en-US" sz="1800" b="0" i="0" u="none" strike="noStrike" kern="1200" cap="none" spc="0" normalizeH="0" baseline="0" noProof="0">
+              <a:ln>
+                <a:noFill/>
+              </a:ln>
+              <a:solidFill>
+                <a:srgbClr val="000000"/>
+              </a:solidFill>
+              <a:effectLst/>
+              <a:uLnTx/>
+              <a:uFillTx/>
+              <a:latin typeface="Calibri" panose="020F0502020204030204"/>
+              <a:ea typeface="+mn-ea"/>
+              <a:cs typeface="+mn-cs"/>
+            </a:endParaRPr>
+          </a:p>
+        </p:txBody>
+      </p:sp>
+      <p:pic>
+        <p:nvPicPr>
+          <p:cNvPr id="5" name="Picture 4" descr="A white screen with black text&#10;&#10;Description automatically generated">
+            <a:extLst>
+              <a:ext uri="{FF2B5EF4-FFF2-40B4-BE49-F238E27FC236}">
+                <a16:creationId xmlns:a16="http://schemas.microsoft.com/office/drawing/2014/main" id="{F2A9A8EF-E3B9-B9CE-9D19-B9C2229906B2}"/>
+              </a:ext>
+            </a:extLst>
+          </p:cNvPr>
+          <p:cNvPicPr>
+            <a:picLocks noChangeAspect="1"/>
+          </p:cNvPicPr>
+          <p:nvPr/>
+        </p:nvPicPr>
+        <p:blipFill>
+          <a:blip r:embed="rId2">
+            <a:extLst>
+              <a:ext uri="{28A0092B-C50C-407E-A947-70E740481C1C}">
+                <a14:useLocalDpi xmlns:a14="http://schemas.microsoft.com/office/drawing/2010/main" val="0"/>
+              </a:ext>
+            </a:extLst>
+          </a:blip>
+          <a:stretch>
+            <a:fillRect/>
+          </a:stretch>
+        </p:blipFill>
+        <p:spPr>
+          <a:xfrm>
+            <a:off x="659914" y="797039"/>
+            <a:ext cx="10872172" cy="2772402"/>
+          </a:xfrm>
+          <a:custGeom>
+            <a:avLst/>
+            <a:gdLst/>
+            <a:ahLst/>
+            <a:cxnLst/>
+            <a:rect l="l" t="t" r="r" b="b"/>
+            <a:pathLst>
+              <a:path w="10580201" h="2957472">
+                <a:moveTo>
+                  <a:pt x="88961" y="0"/>
+                </a:moveTo>
+                <a:lnTo>
+                  <a:pt x="10491240" y="0"/>
+                </a:lnTo>
+                <a:cubicBezTo>
+                  <a:pt x="10540372" y="0"/>
+                  <a:pt x="10580201" y="39829"/>
+                  <a:pt x="10580201" y="88961"/>
+                </a:cubicBezTo>
+                <a:lnTo>
+                  <a:pt x="10580201" y="2868511"/>
+                </a:lnTo>
+                <a:cubicBezTo>
+                  <a:pt x="10580201" y="2917643"/>
+                  <a:pt x="10540372" y="2957472"/>
+                  <a:pt x="10491240" y="2957472"/>
+                </a:cubicBezTo>
+                <a:lnTo>
+                  <a:pt x="88961" y="2957472"/>
+                </a:lnTo>
+                <a:cubicBezTo>
+                  <a:pt x="39829" y="2957472"/>
+                  <a:pt x="0" y="2917643"/>
+                  <a:pt x="0" y="2868511"/>
+                </a:cubicBezTo>
+                <a:lnTo>
+                  <a:pt x="0" y="88961"/>
+                </a:lnTo>
+                <a:cubicBezTo>
+                  <a:pt x="0" y="39829"/>
+                  <a:pt x="39829" y="0"/>
+                  <a:pt x="88961" y="0"/>
+                </a:cubicBezTo>
+                <a:close/>
+              </a:path>
+            </a:pathLst>
+          </a:custGeom>
+        </p:spPr>
+      </p:pic>
+      <p:sp>
+        <p:nvSpPr>
+          <p:cNvPr id="3" name="Content Placeholder 2">
+            <a:extLst>
+              <a:ext uri="{FF2B5EF4-FFF2-40B4-BE49-F238E27FC236}">
+                <a16:creationId xmlns:a16="http://schemas.microsoft.com/office/drawing/2014/main" id="{E5FF89EC-6F29-E211-5DD0-0ECD58C348ED}"/>
+              </a:ext>
+            </a:extLst>
+          </p:cNvPr>
+          <p:cNvSpPr>
+            <a:spLocks noGrp="1"/>
+          </p:cNvSpPr>
+          <p:nvPr>
+            <p:ph idx="1"/>
+          </p:nvPr>
+        </p:nvSpPr>
+        <p:spPr>
+          <a:xfrm>
+            <a:off x="4970835" y="3998019"/>
+            <a:ext cx="6382966" cy="2216512"/>
+          </a:xfrm>
+        </p:spPr>
+        <p:txBody>
+          <a:bodyPr>
+            <a:normAutofit/>
+          </a:bodyPr>
+          <a:lstStyle/>
+          <a:p>
+            <a:r>
+              <a:rPr lang="en-US" sz="2400"/>
+              <a:t>A comment may be used to amplify the importance of something that may otherwise seem inconsequential.</a:t>
+            </a:r>
+          </a:p>
+          <a:p>
+            <a:endParaRPr lang="en-US" sz="2400"/>
+          </a:p>
+        </p:txBody>
+      </p:sp>
+    </p:spTree>
+    <p:extLst>
+      <p:ext uri="{BB962C8B-B14F-4D97-AF65-F5344CB8AC3E}">
+        <p14:creationId xmlns:p14="http://schemas.microsoft.com/office/powerpoint/2010/main" val="1135186184"/>
+      </p:ext>
+    </p:extLst>
+  </p:cSld>
+  <p:clrMapOvr>
+    <a:masterClrMapping/>
+  </p:clrMapOvr>
+</p:sld>
+</file>
+
+<file path=ppt/slides/slide14.xml><?xml version="1.0" encoding="utf-8"?>
+<p:sld xmlns:a="http://schemas.openxmlformats.org/drawingml/2006/main" xmlns:r="http://schemas.openxmlformats.org/officeDocument/2006/relationships" xmlns:p="http://schemas.openxmlformats.org/presentationml/2006/main">
+  <p:cSld>
+    <p:spTree>
+      <p:nvGrpSpPr>
+        <p:cNvPr id="1" name=""/>
+        <p:cNvGrpSpPr/>
+        <p:nvPr/>
+      </p:nvGrpSpPr>
+      <p:grpSpPr>
+        <a:xfrm>
+          <a:off x="0" y="0"/>
+          <a:ext cx="0" cy="0"/>
+          <a:chOff x="0" y="0"/>
+          <a:chExt cx="0" cy="0"/>
+        </a:xfrm>
+      </p:grpSpPr>
+      <p:sp>
+        <p:nvSpPr>
+          <p:cNvPr id="2" name="Title 1">
+            <a:extLst>
+              <a:ext uri="{FF2B5EF4-FFF2-40B4-BE49-F238E27FC236}">
+                <a16:creationId xmlns:a16="http://schemas.microsoft.com/office/drawing/2014/main" id="{F032E298-1562-92C7-E210-4B08A64A767B}"/>
+              </a:ext>
+            </a:extLst>
+          </p:cNvPr>
+          <p:cNvSpPr>
+            <a:spLocks noGrp="1"/>
+          </p:cNvSpPr>
+          <p:nvPr>
+            <p:ph type="title"/>
+          </p:nvPr>
+        </p:nvSpPr>
+        <p:spPr/>
+        <p:txBody>
+          <a:bodyPr/>
+          <a:lstStyle/>
+          <a:p>
+            <a:r>
+              <a:rPr lang="en-US" dirty="0"/>
+              <a:t>Good Comments – Javadocs in Public APIs</a:t>
+            </a:r>
+          </a:p>
+        </p:txBody>
+      </p:sp>
+      <p:sp>
+        <p:nvSpPr>
+          <p:cNvPr id="3" name="Content Placeholder 2">
+            <a:extLst>
+              <a:ext uri="{FF2B5EF4-FFF2-40B4-BE49-F238E27FC236}">
+                <a16:creationId xmlns:a16="http://schemas.microsoft.com/office/drawing/2014/main" id="{549797EA-8254-85A9-7C98-44F17F50FDF5}"/>
+              </a:ext>
+            </a:extLst>
+          </p:cNvPr>
+          <p:cNvSpPr>
+            <a:spLocks noGrp="1"/>
+          </p:cNvSpPr>
+          <p:nvPr>
+            <p:ph idx="1"/>
+          </p:nvPr>
+        </p:nvSpPr>
+        <p:spPr/>
+        <p:txBody>
+          <a:bodyPr/>
+          <a:lstStyle/>
+          <a:p>
+            <a:endParaRPr lang="en-US" dirty="0"/>
+          </a:p>
+          <a:p>
+            <a:r>
+              <a:rPr lang="en-US" dirty="0"/>
+              <a:t>If you are writing a public API, then you should certainly write good javadocs for it.</a:t>
+            </a:r>
+          </a:p>
+          <a:p>
+            <a:endParaRPr lang="en-US" dirty="0"/>
+          </a:p>
+          <a:p>
+            <a:endParaRPr lang="en-US" dirty="0"/>
+          </a:p>
+          <a:p>
+            <a:r>
+              <a:rPr lang="en-US" dirty="0"/>
+              <a:t>But javadocs can be just as misleading, nonlocal, and dishonest as nay other kind of comment.</a:t>
+            </a:r>
+          </a:p>
+        </p:txBody>
+      </p:sp>
+    </p:spTree>
+    <p:extLst>
+      <p:ext uri="{BB962C8B-B14F-4D97-AF65-F5344CB8AC3E}">
+        <p14:creationId xmlns:p14="http://schemas.microsoft.com/office/powerpoint/2010/main" val="3568338773"/>
+      </p:ext>
+    </p:extLst>
+  </p:cSld>
+  <p:clrMapOvr>
+    <a:masterClrMapping/>
+  </p:clrMapOvr>
+</p:sld>
+</file>
+
+<file path=ppt/slides/slide15.xml><?xml version="1.0" encoding="utf-8"?>
+<p:sld xmlns:a="http://schemas.openxmlformats.org/drawingml/2006/main" xmlns:r="http://schemas.openxmlformats.org/officeDocument/2006/relationships" xmlns:p="http://schemas.openxmlformats.org/presentationml/2006/main">
+  <p:cSld>
+    <p:spTree>
+      <p:nvGrpSpPr>
+        <p:cNvPr id="1" name=""/>
+        <p:cNvGrpSpPr/>
+        <p:nvPr/>
+      </p:nvGrpSpPr>
+      <p:grpSpPr>
+        <a:xfrm>
+          <a:off x="0" y="0"/>
+          <a:ext cx="0" cy="0"/>
+          <a:chOff x="0" y="0"/>
+          <a:chExt cx="0" cy="0"/>
+        </a:xfrm>
+      </p:grpSpPr>
+      <p:sp>
+        <p:nvSpPr>
+          <p:cNvPr id="2" name="Title 1">
+            <a:extLst>
+              <a:ext uri="{FF2B5EF4-FFF2-40B4-BE49-F238E27FC236}">
+                <a16:creationId xmlns:a16="http://schemas.microsoft.com/office/drawing/2014/main" id="{94CF661C-002F-8A18-093F-6A522E9DD473}"/>
+              </a:ext>
+            </a:extLst>
+          </p:cNvPr>
+          <p:cNvSpPr>
+            <a:spLocks noGrp="1"/>
+          </p:cNvSpPr>
+          <p:nvPr>
+            <p:ph type="title"/>
+          </p:nvPr>
+        </p:nvSpPr>
+        <p:spPr/>
+        <p:txBody>
+          <a:bodyPr/>
+          <a:lstStyle/>
+          <a:p>
+            <a:r>
+              <a:rPr lang="en-US" dirty="0"/>
+              <a:t>Bad Comments</a:t>
+            </a:r>
+          </a:p>
+        </p:txBody>
+      </p:sp>
+      <p:sp>
+        <p:nvSpPr>
+          <p:cNvPr id="3" name="Content Placeholder 2">
+            <a:extLst>
+              <a:ext uri="{FF2B5EF4-FFF2-40B4-BE49-F238E27FC236}">
+                <a16:creationId xmlns:a16="http://schemas.microsoft.com/office/drawing/2014/main" id="{03F88C7C-525A-46A2-5030-AED34941DF29}"/>
+              </a:ext>
+            </a:extLst>
+          </p:cNvPr>
+          <p:cNvSpPr>
+            <a:spLocks noGrp="1"/>
+          </p:cNvSpPr>
+          <p:nvPr>
+            <p:ph idx="1"/>
+          </p:nvPr>
+        </p:nvSpPr>
+        <p:spPr/>
+        <p:txBody>
+          <a:bodyPr/>
+          <a:lstStyle/>
+          <a:p>
+            <a:endParaRPr lang="en-US" dirty="0"/>
+          </a:p>
+          <a:p>
+            <a:r>
+              <a:rPr lang="en-US" dirty="0"/>
+              <a:t>Most comments fall into this category “bad”.</a:t>
+            </a:r>
+          </a:p>
+          <a:p>
+            <a:endParaRPr lang="en-US" dirty="0"/>
+          </a:p>
+          <a:p>
+            <a:endParaRPr lang="en-US" dirty="0"/>
+          </a:p>
+          <a:p>
+            <a:r>
+              <a:rPr lang="en-US" dirty="0"/>
+              <a:t>Usually, they are crutches or excuses for poor code or justifications for insufficient decisions, amounting to little more than the programmer talking to himself.</a:t>
+            </a:r>
+          </a:p>
+        </p:txBody>
+      </p:sp>
+    </p:spTree>
+    <p:extLst>
+      <p:ext uri="{BB962C8B-B14F-4D97-AF65-F5344CB8AC3E}">
+        <p14:creationId xmlns:p14="http://schemas.microsoft.com/office/powerpoint/2010/main" val="2980883879"/>
+      </p:ext>
+    </p:extLst>
+  </p:cSld>
+  <p:clrMapOvr>
+    <a:masterClrMapping/>
+  </p:clrMapOvr>
+</p:sld>
+</file>
+
+<file path=ppt/slides/slide16.xml><?xml version="1.0" encoding="utf-8"?>
+<p:sld xmlns:a="http://schemas.openxmlformats.org/drawingml/2006/main" xmlns:r="http://schemas.openxmlformats.org/officeDocument/2006/relationships" xmlns:p="http://schemas.openxmlformats.org/presentationml/2006/main">
+  <p:cSld>
+    <p:spTree>
+      <p:nvGrpSpPr>
+        <p:cNvPr id="1" name=""/>
+        <p:cNvGrpSpPr/>
+        <p:nvPr/>
+      </p:nvGrpSpPr>
+      <p:grpSpPr>
+        <a:xfrm>
+          <a:off x="0" y="0"/>
+          <a:ext cx="0" cy="0"/>
+          <a:chOff x="0" y="0"/>
+          <a:chExt cx="0" cy="0"/>
+        </a:xfrm>
+      </p:grpSpPr>
+      <p:sp>
+        <p:nvSpPr>
+          <p:cNvPr id="2" name="Title 1">
+            <a:extLst>
+              <a:ext uri="{FF2B5EF4-FFF2-40B4-BE49-F238E27FC236}">
+                <a16:creationId xmlns:a16="http://schemas.microsoft.com/office/drawing/2014/main" id="{094F273A-20EB-F376-3FCF-5CD1895533CA}"/>
+              </a:ext>
+            </a:extLst>
+          </p:cNvPr>
+          <p:cNvSpPr>
+            <a:spLocks noGrp="1"/>
+          </p:cNvSpPr>
+          <p:nvPr>
+            <p:ph type="title"/>
+          </p:nvPr>
+        </p:nvSpPr>
+        <p:spPr/>
+        <p:txBody>
+          <a:bodyPr/>
+          <a:lstStyle/>
+          <a:p>
+            <a:r>
+              <a:rPr lang="en-US" dirty="0"/>
+              <a:t>Bad Comments – Mumbling</a:t>
+            </a:r>
+          </a:p>
+        </p:txBody>
+      </p:sp>
+      <p:sp>
+        <p:nvSpPr>
+          <p:cNvPr id="3" name="Content Placeholder 2">
+            <a:extLst>
+              <a:ext uri="{FF2B5EF4-FFF2-40B4-BE49-F238E27FC236}">
+                <a16:creationId xmlns:a16="http://schemas.microsoft.com/office/drawing/2014/main" id="{B38E1D17-1A96-01A0-DE7B-EB32C240B2C4}"/>
+              </a:ext>
+            </a:extLst>
+          </p:cNvPr>
+          <p:cNvSpPr>
+            <a:spLocks noGrp="1"/>
+          </p:cNvSpPr>
+          <p:nvPr>
+            <p:ph idx="1"/>
+          </p:nvPr>
+        </p:nvSpPr>
+        <p:spPr/>
+        <p:txBody>
+          <a:bodyPr/>
+          <a:lstStyle/>
+          <a:p>
+            <a:endParaRPr lang="en-US" dirty="0"/>
+          </a:p>
+          <a:p>
+            <a:r>
+              <a:rPr lang="en-US" dirty="0"/>
+              <a:t>If you decide to write a comment, then spend the time necessary to make sure it’s the best comment you can write.</a:t>
+            </a:r>
+          </a:p>
+          <a:p>
+            <a:endParaRPr lang="en-US" dirty="0"/>
+          </a:p>
+          <a:p>
+            <a:r>
+              <a:rPr lang="en-US" dirty="0"/>
+              <a:t>Any comment that forces you to look in another module for the meaning of that comment has failed to communicate to you and isn’t worth the bits it consumes.</a:t>
+            </a:r>
+          </a:p>
+        </p:txBody>
+      </p:sp>
+    </p:spTree>
+    <p:extLst>
+      <p:ext uri="{BB962C8B-B14F-4D97-AF65-F5344CB8AC3E}">
+        <p14:creationId xmlns:p14="http://schemas.microsoft.com/office/powerpoint/2010/main" val="551709605"/>
+      </p:ext>
+    </p:extLst>
+  </p:cSld>
+  <p:clrMapOvr>
+    <a:masterClrMapping/>
+  </p:clrMapOvr>
+</p:sld>
+</file>
+
+<file path=ppt/slides/slide17.xml><?xml version="1.0" encoding="utf-8"?>
+<p:sld xmlns:a="http://schemas.openxmlformats.org/drawingml/2006/main" xmlns:r="http://schemas.openxmlformats.org/officeDocument/2006/relationships" xmlns:p="http://schemas.openxmlformats.org/presentationml/2006/main">
+  <p:cSld>
+    <p:spTree>
+      <p:nvGrpSpPr>
+        <p:cNvPr id="1" name=""/>
+        <p:cNvGrpSpPr/>
+        <p:nvPr/>
+      </p:nvGrpSpPr>
+      <p:grpSpPr>
+        <a:xfrm>
+          <a:off x="0" y="0"/>
+          <a:ext cx="0" cy="0"/>
+          <a:chOff x="0" y="0"/>
+          <a:chExt cx="0" cy="0"/>
+        </a:xfrm>
+      </p:grpSpPr>
+      <p:sp>
+        <p:nvSpPr>
+          <p:cNvPr id="2" name="Title 1">
+            <a:extLst>
+              <a:ext uri="{FF2B5EF4-FFF2-40B4-BE49-F238E27FC236}">
+                <a16:creationId xmlns:a16="http://schemas.microsoft.com/office/drawing/2014/main" id="{AA87A7B2-F73A-82B7-7C35-ABCA01809C3E}"/>
+              </a:ext>
+            </a:extLst>
+          </p:cNvPr>
+          <p:cNvSpPr>
+            <a:spLocks noGrp="1"/>
+          </p:cNvSpPr>
+          <p:nvPr>
+            <p:ph type="title"/>
+          </p:nvPr>
+        </p:nvSpPr>
+        <p:spPr/>
+        <p:txBody>
+          <a:bodyPr/>
+          <a:lstStyle/>
+          <a:p>
+            <a:r>
+              <a:rPr lang="en-US" dirty="0"/>
+              <a:t>Bad Comment – Redundant Comments</a:t>
+            </a:r>
+          </a:p>
+        </p:txBody>
+      </p:sp>
+      <p:sp>
+        <p:nvSpPr>
+          <p:cNvPr id="3" name="Content Placeholder 2">
+            <a:extLst>
+              <a:ext uri="{FF2B5EF4-FFF2-40B4-BE49-F238E27FC236}">
+                <a16:creationId xmlns:a16="http://schemas.microsoft.com/office/drawing/2014/main" id="{8AB83519-319E-BB44-45B8-3670979237A8}"/>
+              </a:ext>
+            </a:extLst>
+          </p:cNvPr>
+          <p:cNvSpPr>
+            <a:spLocks noGrp="1"/>
+          </p:cNvSpPr>
+          <p:nvPr>
+            <p:ph idx="1"/>
+          </p:nvPr>
+        </p:nvSpPr>
+        <p:spPr/>
+        <p:txBody>
+          <a:bodyPr/>
+          <a:lstStyle/>
+          <a:p>
+            <a:endParaRPr lang="en-US" dirty="0"/>
+          </a:p>
+          <a:p>
+            <a:r>
+              <a:rPr lang="en-US" dirty="0"/>
+              <a:t>The comment probably takes longer to read than the code itself.</a:t>
+            </a:r>
+          </a:p>
+          <a:p>
+            <a:endParaRPr lang="en-US" dirty="0"/>
+          </a:p>
+          <a:p>
+            <a:r>
+              <a:rPr lang="en-US" dirty="0"/>
+              <a:t>It doesn’t justify the code or provide intent or rationale.</a:t>
+            </a:r>
+          </a:p>
+          <a:p>
+            <a:endParaRPr lang="en-US" dirty="0"/>
+          </a:p>
+          <a:p>
+            <a:r>
+              <a:rPr lang="en-US" dirty="0"/>
+              <a:t>These comments serve only to clutter and obscure the code.</a:t>
+            </a:r>
+          </a:p>
+        </p:txBody>
+      </p:sp>
+    </p:spTree>
+    <p:extLst>
+      <p:ext uri="{BB962C8B-B14F-4D97-AF65-F5344CB8AC3E}">
+        <p14:creationId xmlns:p14="http://schemas.microsoft.com/office/powerpoint/2010/main" val="2055838642"/>
+      </p:ext>
+    </p:extLst>
+  </p:cSld>
+  <p:clrMapOvr>
+    <a:masterClrMapping/>
+  </p:clrMapOvr>
+</p:sld>
+</file>
+
+<file path=ppt/slides/slide18.xml><?xml version="1.0" encoding="utf-8"?>
+<p:sld xmlns:a="http://schemas.openxmlformats.org/drawingml/2006/main" xmlns:r="http://schemas.openxmlformats.org/officeDocument/2006/relationships" xmlns:p="http://schemas.openxmlformats.org/presentationml/2006/main">
+  <p:cSld>
+    <p:spTree>
+      <p:nvGrpSpPr>
+        <p:cNvPr id="1" name=""/>
+        <p:cNvGrpSpPr/>
+        <p:nvPr/>
+      </p:nvGrpSpPr>
+      <p:grpSpPr>
+        <a:xfrm>
+          <a:off x="0" y="0"/>
+          <a:ext cx="0" cy="0"/>
+          <a:chOff x="0" y="0"/>
+          <a:chExt cx="0" cy="0"/>
+        </a:xfrm>
+      </p:grpSpPr>
+      <p:sp>
+        <p:nvSpPr>
+          <p:cNvPr id="2" name="Title 1">
+            <a:extLst>
+              <a:ext uri="{FF2B5EF4-FFF2-40B4-BE49-F238E27FC236}">
+                <a16:creationId xmlns:a16="http://schemas.microsoft.com/office/drawing/2014/main" id="{BDCEC9AF-36BB-1B5F-0ED6-2A3C7389232F}"/>
+              </a:ext>
+            </a:extLst>
+          </p:cNvPr>
+          <p:cNvSpPr>
+            <a:spLocks noGrp="1"/>
+          </p:cNvSpPr>
+          <p:nvPr>
+            <p:ph type="title"/>
+          </p:nvPr>
+        </p:nvSpPr>
+        <p:spPr/>
+        <p:txBody>
+          <a:bodyPr/>
+          <a:lstStyle/>
+          <a:p>
+            <a:r>
+              <a:rPr lang="en-US" dirty="0"/>
+              <a:t>Bad Comment – Misleading Comments</a:t>
+            </a:r>
+          </a:p>
+        </p:txBody>
+      </p:sp>
+      <p:sp>
+        <p:nvSpPr>
+          <p:cNvPr id="3" name="Content Placeholder 2">
+            <a:extLst>
+              <a:ext uri="{FF2B5EF4-FFF2-40B4-BE49-F238E27FC236}">
+                <a16:creationId xmlns:a16="http://schemas.microsoft.com/office/drawing/2014/main" id="{726666A5-19A2-16F0-799D-4AE68833F699}"/>
+              </a:ext>
+            </a:extLst>
+          </p:cNvPr>
+          <p:cNvSpPr>
+            <a:spLocks noGrp="1"/>
+          </p:cNvSpPr>
+          <p:nvPr>
+            <p:ph idx="1"/>
+          </p:nvPr>
+        </p:nvSpPr>
+        <p:spPr/>
+        <p:txBody>
+          <a:bodyPr/>
+          <a:lstStyle/>
+          <a:p>
+            <a:endParaRPr lang="en-US" dirty="0"/>
+          </a:p>
+          <a:p>
+            <a:endParaRPr lang="en-US" dirty="0"/>
+          </a:p>
+          <a:p>
+            <a:r>
+              <a:rPr lang="en-US" dirty="0"/>
+              <a:t>Sometimes, with all the best intentions, a programmer makes a statement in his comments that isn’t precise enough to be accurate.</a:t>
+            </a:r>
+          </a:p>
+        </p:txBody>
+      </p:sp>
+    </p:spTree>
+    <p:extLst>
+      <p:ext uri="{BB962C8B-B14F-4D97-AF65-F5344CB8AC3E}">
+        <p14:creationId xmlns:p14="http://schemas.microsoft.com/office/powerpoint/2010/main" val="4176403067"/>
+      </p:ext>
+    </p:extLst>
+  </p:cSld>
+  <p:clrMapOvr>
+    <a:masterClrMapping/>
+  </p:clrMapOvr>
+</p:sld>
+</file>
+
 <file path=ppt/slides/slide2.xml><?xml version="1.0" encoding="utf-8"?>
 <p:sld xmlns:a="http://schemas.openxmlformats.org/drawingml/2006/main" xmlns:r="http://schemas.openxmlformats.org/officeDocument/2006/relationships" xmlns:p="http://schemas.openxmlformats.org/presentationml/2006/main">
   <p:cSld>

</xml_diff>